<commit_message>
Make diagram more readable
</commit_message>
<xml_diff>
--- a/docs/diagrams/HighLevelSequenceDiagrams.pptx
+++ b/docs/diagrams/HighLevelSequenceDiagrams.pptx
@@ -7574,8 +7574,8 @@
         </p:nvSpPr>
         <p:spPr>
           <a:xfrm>
-            <a:off x="1946448" y="4797674"/>
-            <a:ext cx="3037482" cy="215444"/>
+            <a:off x="2056036" y="4813661"/>
+            <a:ext cx="3037482" cy="200055"/>
           </a:xfrm>
           <a:prstGeom prst="rect">
             <a:avLst/>
@@ -7589,7 +7589,7 @@
           <a:lstStyle/>
           <a:p>
             <a:r>
-              <a:rPr lang="en-US" sz="1400" dirty="0" smtClean="0">
+              <a:rPr lang="en-US" sz="1300" dirty="0" smtClean="0">
                 <a:solidFill>
                   <a:schemeClr val="accent5">
                     <a:lumMod val="75000"/>
@@ -7599,7 +7599,7 @@
               <a:t>post(</a:t>
             </a:r>
             <a:r>
-              <a:rPr lang="en-US" sz="1400" dirty="0" err="1" smtClean="0">
+              <a:rPr lang="en-US" sz="1300" dirty="0" err="1" smtClean="0">
                 <a:solidFill>
                   <a:schemeClr val="accent5">
                     <a:lumMod val="75000"/>
@@ -7609,7 +7609,7 @@
               <a:t>PartTimeManagerChangedEvent</a:t>
             </a:r>
             <a:r>
-              <a:rPr lang="en-US" sz="1400" dirty="0" smtClean="0">
+              <a:rPr lang="en-US" sz="1300" dirty="0" smtClean="0">
                 <a:solidFill>
                   <a:schemeClr val="accent5">
                     <a:lumMod val="75000"/>
@@ -7618,7 +7618,7 @@
               </a:rPr>
               <a:t>)</a:t>
             </a:r>
-            <a:endParaRPr lang="en-US" sz="1400" dirty="0">
+            <a:endParaRPr lang="en-US" sz="1300" dirty="0">
               <a:solidFill>
                 <a:schemeClr val="accent5">
                   <a:lumMod val="75000"/>
@@ -7956,8 +7956,8 @@
         </p:nvSpPr>
         <p:spPr>
           <a:xfrm>
-            <a:off x="5257800" y="5065911"/>
-            <a:ext cx="3115614" cy="215444"/>
+            <a:off x="5383476" y="5080964"/>
+            <a:ext cx="3115614" cy="200055"/>
           </a:xfrm>
           <a:prstGeom prst="rect">
             <a:avLst/>
@@ -7971,7 +7971,7 @@
           <a:lstStyle/>
           <a:p>
             <a:r>
-              <a:rPr lang="en-US" sz="1400" smtClean="0">
+              <a:rPr lang="en-US" sz="1300" smtClean="0">
                 <a:solidFill>
                   <a:schemeClr val="accent6">
                     <a:lumMod val="75000"/>
@@ -7981,7 +7981,7 @@
               <a:t>handlePartTimeManagerChangedEvent</a:t>
             </a:r>
             <a:r>
-              <a:rPr lang="en-US" sz="1400" dirty="0" smtClean="0">
+              <a:rPr lang="en-US" sz="1300" dirty="0" smtClean="0">
                 <a:solidFill>
                   <a:schemeClr val="accent6">
                     <a:lumMod val="75000"/>
@@ -7990,7 +7990,7 @@
               </a:rPr>
               <a:t>()</a:t>
             </a:r>
-            <a:endParaRPr lang="en-US" sz="1400" dirty="0">
+            <a:endParaRPr lang="en-US" sz="1300" dirty="0">
               <a:solidFill>
                 <a:schemeClr val="accent6">
                   <a:lumMod val="75000"/>
@@ -8270,7 +8270,7 @@
         <p:spPr>
           <a:xfrm>
             <a:off x="1828800" y="5395369"/>
-            <a:ext cx="3147465" cy="215444"/>
+            <a:ext cx="3147465" cy="200055"/>
           </a:xfrm>
           <a:prstGeom prst="rect">
             <a:avLst/>
@@ -8284,7 +8284,7 @@
           <a:lstStyle/>
           <a:p>
             <a:r>
-              <a:rPr lang="en-US" sz="1400" smtClean="0">
+              <a:rPr lang="en-US" sz="1300" dirty="0" err="1" smtClean="0">
                 <a:solidFill>
                   <a:srgbClr val="00B050"/>
                 </a:solidFill>
@@ -8292,14 +8292,14 @@
               <a:t>handlePartTimeManagerChangedEvent</a:t>
             </a:r>
             <a:r>
-              <a:rPr lang="en-US" sz="1400" dirty="0" smtClean="0">
+              <a:rPr lang="en-US" sz="1300" dirty="0" smtClean="0">
                 <a:solidFill>
                   <a:srgbClr val="00B050"/>
                 </a:solidFill>
               </a:rPr>
               <a:t>()</a:t>
             </a:r>
-            <a:endParaRPr lang="en-US" sz="1400" dirty="0">
+            <a:endParaRPr lang="en-US" sz="1300" dirty="0">
               <a:solidFill>
                 <a:srgbClr val="00B050"/>
               </a:solidFill>
@@ -8475,7 +8475,7 @@
         <p:spPr>
           <a:xfrm>
             <a:off x="-312128" y="5290024"/>
-            <a:ext cx="1979243" cy="215444"/>
+            <a:ext cx="1979243" cy="200055"/>
           </a:xfrm>
           <a:prstGeom prst="rect">
             <a:avLst/>
@@ -8490,7 +8490,7 @@
           <a:p>
             <a:pPr algn="r"/>
             <a:r>
-              <a:rPr lang="en-US" sz="1400" dirty="0" err="1" smtClean="0">
+              <a:rPr lang="en-US" sz="1300" dirty="0" err="1" smtClean="0">
                 <a:solidFill>
                   <a:srgbClr val="00B050"/>
                 </a:solidFill>
@@ -8498,14 +8498,14 @@
               <a:t>updateTimetableView</a:t>
             </a:r>
             <a:r>
-              <a:rPr lang="en-US" sz="1400" dirty="0" smtClean="0">
+              <a:rPr lang="en-US" sz="1300" dirty="0" smtClean="0">
                 <a:solidFill>
                   <a:srgbClr val="00B050"/>
                 </a:solidFill>
               </a:rPr>
               <a:t>()</a:t>
             </a:r>
-            <a:endParaRPr lang="en-US" sz="1400" dirty="0">
+            <a:endParaRPr lang="en-US" sz="1300" dirty="0">
               <a:solidFill>
                 <a:srgbClr val="00B050"/>
               </a:solidFill>

</xml_diff>